<commit_message>
added song beamer conversion and updated readMe
</commit_message>
<xml_diff>
--- a/output/hymns/How-Great-Thou-Art.pptx
+++ b/output/hymns/How-Great-Thou-Art.pptx
@@ -9,6 +9,7 @@
     <p:sldId r:id="rId9" id="257"/>
     <p:sldId r:id="rId10" id="258"/>
     <p:sldId r:id="rId11" id="259"/>
+    <p:sldId r:id="rId12" id="260"/>
   </p:sldIdLst>
   <p:sldSz cx="9144000" cy="6858000" type="screen4x3"/>
   <p:notesSz cx="6858000" cy="9144000"/>
@@ -505,7 +506,7 @@
           <a:lstStyle/>
           <a:p>
             <a:r>
-              <a:t>Verse 1</a:t>
+              <a:t>Intro</a:t>
             </a:r>
             <a:br/>
             <a:r>
@@ -583,7 +584,7 @@
           <a:lstStyle/>
           <a:p>
             <a:r>
-              <a:t>Chorus</a:t>
+              <a:t>Verse 1</a:t>
             </a:r>
             <a:br/>
             <a:r>
@@ -661,7 +662,7 @@
           <a:lstStyle/>
           <a:p>
             <a:r>
-              <a:t>Verse 2:</a:t>
+              <a:t>Chorus</a:t>
             </a:r>
             <a:br/>
             <a:r>
@@ -695,6 +696,84 @@
 </file>
 
 <file path=ppt/notesSlides/notesSlide4.xml><?xml version="1.0" encoding="utf-8"?>
+<p:notes xmlns:a="http://schemas.openxmlformats.org/drawingml/2006/main" xmlns:p="http://schemas.openxmlformats.org/presentationml/2006/main" xmlns:r="http://schemas.openxmlformats.org/officeDocument/2006/relationships">
+  <p:cSld>
+    <p:spTree>
+      <p:nvGrpSpPr>
+        <p:cNvPr id="1" name=""/>
+        <p:cNvGrpSpPr/>
+        <p:nvPr/>
+      </p:nvGrpSpPr>
+      <p:grpSpPr>
+        <a:xfrm>
+          <a:off x="0" y="0"/>
+          <a:ext cx="0" cy="0"/>
+          <a:chOff x="0" y="0"/>
+          <a:chExt cx="0" cy="0"/>
+        </a:xfrm>
+      </p:grpSpPr>
+      <p:sp>
+        <p:nvSpPr>
+          <p:cNvPr id="2" name="Slide Image Placeholder 1"/>
+          <p:cNvSpPr>
+            <a:spLocks noGrp="1"/>
+          </p:cNvSpPr>
+          <p:nvPr>
+            <p:ph type="sldImg" idx="2"/>
+          </p:nvPr>
+        </p:nvSpPr>
+        <p:spPr/>
+      </p:sp>
+      <p:sp>
+        <p:nvSpPr>
+          <p:cNvPr id="3" name="Notes Placeholder 2"/>
+          <p:cNvSpPr>
+            <a:spLocks noGrp="1"/>
+          </p:cNvSpPr>
+          <p:nvPr>
+            <p:ph type="body" idx="3" sz="quarter"/>
+          </p:nvPr>
+        </p:nvSpPr>
+        <p:spPr/>
+        <p:txBody>
+          <a:bodyPr/>
+          <a:lstStyle/>
+          <a:p>
+            <a:r>
+              <a:t>Verse 2:</a:t>
+            </a:r>
+            <a:br/>
+            <a:r>
+              <a:t>Writers:  Stuart K. Hine</a:t>
+            </a:r>
+            <a:br/>
+            <a:r>
+              <a:t>CCLI: </a:t>
+            </a:r>
+          </a:p>
+        </p:txBody>
+      </p:sp>
+      <p:sp>
+        <p:nvSpPr>
+          <p:cNvPr id="4" name="Slide Number Placeholder 3"/>
+          <p:cNvSpPr>
+            <a:spLocks noGrp="1"/>
+          </p:cNvSpPr>
+          <p:nvPr>
+            <p:ph type="sldNum" idx="5" sz="quarter"/>
+          </p:nvPr>
+        </p:nvSpPr>
+        <p:spPr/>
+      </p:sp>
+    </p:spTree>
+  </p:cSld>
+  <p:clrMapOvr>
+    <a:masterClrMapping/>
+  </p:clrMapOvr>
+</p:notes>
+</file>
+
+<file path=ppt/notesSlides/notesSlide5.xml><?xml version="1.0" encoding="utf-8"?>
 <p:notes xmlns:a="http://schemas.openxmlformats.org/drawingml/2006/main" xmlns:p="http://schemas.openxmlformats.org/presentationml/2006/main" xmlns:r="http://schemas.openxmlformats.org/officeDocument/2006/relationships">
   <p:cSld>
     <p:spTree>
@@ -3779,22 +3858,6 @@
             <a:pPr>
               <a:defRPr sz="2500"/>
             </a:pPr>
-            <a:r>
-              <a:t>O Lord my God, When I in awesome wonder</a:t>
-            </a:r>
-            <a:br/>
-            <a:r>
-              <a:t>Consider all the worlds Thy Hands have made</a:t>
-            </a:r>
-            <a:br/>
-            <a:r>
-              <a:t>I see the stars, I hear the rolling thunder</a:t>
-            </a:r>
-            <a:br/>
-            <a:r>
-              <a:t>Thy power throughout the universe displayed</a:t>
-            </a:r>
-            <a:br/>
           </a:p>
         </p:txBody>
       </p:sp>
@@ -3825,7 +3888,7 @@
               <a:defRPr sz="1200"/>
             </a:pPr>
             <a:r>
-              <a:t>Verse 1</a:t>
+              <a:t>Intro</a:t>
             </a:r>
             <a:br/>
             <a:r>
@@ -3883,19 +3946,19 @@
               <a:defRPr sz="2500"/>
             </a:pPr>
             <a:r>
-              <a:t>Then sings my soul, My Savior God, to Thee</a:t>
+              <a:t>O Lord my God, When I in awesome wonder</a:t>
             </a:r>
             <a:br/>
             <a:r>
-              <a:t>How great Thou art, How great Thou art</a:t>
+              <a:t>Consider all the worlds Thy Hands have made</a:t>
             </a:r>
             <a:br/>
             <a:r>
-              <a:t>Then sings my soul, My Savior God, to Thee</a:t>
+              <a:t>I see the stars, I hear the rolling thunder</a:t>
             </a:r>
             <a:br/>
             <a:r>
-              <a:t>How great Thou art, How great Thou art</a:t>
+              <a:t>Thy power throughout the universe displayed</a:t>
             </a:r>
             <a:br/>
           </a:p>
@@ -3928,7 +3991,7 @@
               <a:defRPr sz="1200"/>
             </a:pPr>
             <a:r>
-              <a:t>Chorus</a:t>
+              <a:t>Verse 1</a:t>
             </a:r>
             <a:br/>
             <a:r>
@@ -3986,19 +4049,19 @@
               <a:defRPr sz="2500"/>
             </a:pPr>
             <a:r>
-              <a:t>And when I think, that God, His Son not sparing</a:t>
+              <a:t>Then sings my soul, My Savior God, to Thee</a:t>
             </a:r>
             <a:br/>
             <a:r>
-              <a:t>Sent Him to die, I scarce can take it in</a:t>
+              <a:t>How great Thou art, How great Thou art</a:t>
             </a:r>
             <a:br/>
             <a:r>
-              <a:t>That on the Cross, my burden gladly bearing</a:t>
+              <a:t>Then sings my soul, My Savior God, to Thee</a:t>
             </a:r>
             <a:br/>
             <a:r>
-              <a:t>He bled and died to take away my sin</a:t>
+              <a:t>How great Thou art, How great Thou art</a:t>
             </a:r>
             <a:br/>
           </a:p>
@@ -4031,7 +4094,7 @@
               <a:defRPr sz="1200"/>
             </a:pPr>
             <a:r>
-              <a:t>Verse 2:</a:t>
+              <a:t>Chorus</a:t>
             </a:r>
             <a:br/>
             <a:r>
@@ -4053,6 +4116,109 @@
 </file>
 
 <file path=ppt/slides/slide4.xml><?xml version="1.0" encoding="utf-8"?>
+<p:sld xmlns:a="http://schemas.openxmlformats.org/drawingml/2006/main" xmlns:p="http://schemas.openxmlformats.org/presentationml/2006/main" xmlns:r="http://schemas.openxmlformats.org/officeDocument/2006/relationships">
+  <p:cSld>
+    <p:spTree>
+      <p:nvGrpSpPr>
+        <p:cNvPr id="1" name=""/>
+        <p:cNvGrpSpPr/>
+        <p:nvPr/>
+      </p:nvGrpSpPr>
+      <p:grpSpPr/>
+      <p:sp>
+        <p:nvSpPr>
+          <p:cNvPr id="2" name="TextBox 1"/>
+          <p:cNvSpPr txBox="1"/>
+          <p:nvPr/>
+        </p:nvSpPr>
+        <p:spPr>
+          <a:xfrm>
+            <a:off x="914400" y="914400"/>
+            <a:ext cx="7315200" cy="914400"/>
+          </a:xfrm>
+          <a:prstGeom prst="rect">
+            <a:avLst/>
+          </a:prstGeom>
+          <a:noFill/>
+        </p:spPr>
+        <p:txBody>
+          <a:bodyPr wrap="none">
+            <a:spAutoFit/>
+          </a:bodyPr>
+          <a:lstStyle/>
+          <a:p/>
+          <a:p>
+            <a:pPr>
+              <a:defRPr sz="2500"/>
+            </a:pPr>
+            <a:r>
+              <a:t>And when I think, that God, His Son not sparing</a:t>
+            </a:r>
+            <a:br/>
+            <a:r>
+              <a:t>Sent Him to die, I scarce can take it in</a:t>
+            </a:r>
+            <a:br/>
+            <a:r>
+              <a:t>That on the Cross, my burden gladly bearing</a:t>
+            </a:r>
+            <a:br/>
+            <a:r>
+              <a:t>He bled and died to take away my sin</a:t>
+            </a:r>
+            <a:br/>
+          </a:p>
+        </p:txBody>
+      </p:sp>
+      <p:sp>
+        <p:nvSpPr>
+          <p:cNvPr id="3" name="TextBox 2"/>
+          <p:cNvSpPr txBox="1"/>
+          <p:nvPr/>
+        </p:nvSpPr>
+        <p:spPr>
+          <a:xfrm>
+            <a:off x="4572000" y="5943600"/>
+            <a:ext cx="914400" cy="914400"/>
+          </a:xfrm>
+          <a:prstGeom prst="rect">
+            <a:avLst/>
+          </a:prstGeom>
+          <a:noFill/>
+        </p:spPr>
+        <p:txBody>
+          <a:bodyPr wrap="none">
+            <a:spAutoFit/>
+          </a:bodyPr>
+          <a:lstStyle/>
+          <a:p/>
+          <a:p>
+            <a:pPr>
+              <a:defRPr sz="1200"/>
+            </a:pPr>
+            <a:r>
+              <a:t>Verse 2:</a:t>
+            </a:r>
+            <a:br/>
+            <a:r>
+              <a:t>Writers:  Stuart K. Hine</a:t>
+            </a:r>
+            <a:br/>
+            <a:r>
+              <a:t>CCLI: </a:t>
+            </a:r>
+          </a:p>
+        </p:txBody>
+      </p:sp>
+    </p:spTree>
+  </p:cSld>
+  <p:clrMapOvr>
+    <a:masterClrMapping/>
+  </p:clrMapOvr>
+</p:sld>
+</file>
+
+<file path=ppt/slides/slide5.xml><?xml version="1.0" encoding="utf-8"?>
 <p:sld xmlns:a="http://schemas.openxmlformats.org/drawingml/2006/main" xmlns:p="http://schemas.openxmlformats.org/presentationml/2006/main" xmlns:r="http://schemas.openxmlformats.org/officeDocument/2006/relationships">
   <p:cSld>
     <p:spTree>

</xml_diff>